<commit_message>
Change transition to fade for every slide
</commit_message>
<xml_diff>
--- a/Presentation.pptx
+++ b/Presentation.pptx
@@ -109,6 +109,11 @@
       </a:defRPr>
     </a:lvl9pPr>
   </p:defaultTextStyle>
+  <p:extLst>
+    <p:ext uri="{EFAFB233-063F-42B5-8137-9DF3F51BA10A}">
+      <p15:sldGuideLst xmlns:p15="http://schemas.microsoft.com/office/powerpoint/2012/main"/>
+    </p:ext>
+  </p:extLst>
 </p:presentation>
 </file>
 
@@ -615,7 +620,7 @@
             <a:fld id="{B61BEF0D-F0BB-DE4B-95CE-6DB70DBA9567}" type="datetimeFigureOut">
               <a:rPr lang="en-US" dirty="0"/>
               <a:pPr/>
-              <a:t>1/19/16</a:t>
+              <a:t>1/22/16</a:t>
             </a:fld>
             <a:endParaRPr lang="en-US" dirty="0"/>
           </a:p>
@@ -674,6 +679,18 @@
   <p:clrMapOvr>
     <a:masterClrMapping/>
   </p:clrMapOvr>
+  <mc:AlternateContent xmlns:mc="http://schemas.openxmlformats.org/markup-compatibility/2006">
+    <mc:Choice xmlns:p14="http://schemas.microsoft.com/office/powerpoint/2010/main" Requires="p14">
+      <p:transition spd="med" p14:dur="700">
+        <p:fade/>
+      </p:transition>
+    </mc:Choice>
+    <mc:Fallback>
+      <p:transition spd="med">
+        <p:fade/>
+      </p:transition>
+    </mc:Fallback>
+  </mc:AlternateContent>
 </p:sldLayout>
 </file>
 
@@ -908,7 +925,7 @@
             <a:fld id="{B61BEF0D-F0BB-DE4B-95CE-6DB70DBA9567}" type="datetimeFigureOut">
               <a:rPr lang="en-US" dirty="0"/>
               <a:pPr/>
-              <a:t>1/19/16</a:t>
+              <a:t>1/22/16</a:t>
             </a:fld>
             <a:endParaRPr lang="en-US" dirty="0"/>
           </a:p>
@@ -962,6 +979,18 @@
   <p:clrMapOvr>
     <a:masterClrMapping/>
   </p:clrMapOvr>
+  <mc:AlternateContent xmlns:mc="http://schemas.openxmlformats.org/markup-compatibility/2006">
+    <mc:Choice xmlns:p14="http://schemas.microsoft.com/office/powerpoint/2010/main" Requires="p14">
+      <p:transition spd="med" p14:dur="700">
+        <p:fade/>
+      </p:transition>
+    </mc:Choice>
+    <mc:Fallback>
+      <p:transition spd="med">
+        <p:fade/>
+      </p:transition>
+    </mc:Fallback>
+  </mc:AlternateContent>
 </p:sldLayout>
 </file>
 
@@ -1153,7 +1182,7 @@
             <a:fld id="{B61BEF0D-F0BB-DE4B-95CE-6DB70DBA9567}" type="datetimeFigureOut">
               <a:rPr lang="en-US" dirty="0"/>
               <a:pPr/>
-              <a:t>1/19/16</a:t>
+              <a:t>1/22/16</a:t>
             </a:fld>
             <a:endParaRPr lang="en-US" dirty="0"/>
           </a:p>
@@ -1207,6 +1236,18 @@
   <p:clrMapOvr>
     <a:masterClrMapping/>
   </p:clrMapOvr>
+  <mc:AlternateContent xmlns:mc="http://schemas.openxmlformats.org/markup-compatibility/2006">
+    <mc:Choice xmlns:p14="http://schemas.microsoft.com/office/powerpoint/2010/main" Requires="p14">
+      <p:transition spd="med" p14:dur="700">
+        <p:fade/>
+      </p:transition>
+    </mc:Choice>
+    <mc:Fallback>
+      <p:transition spd="med">
+        <p:fade/>
+      </p:transition>
+    </mc:Fallback>
+  </mc:AlternateContent>
 </p:sldLayout>
 </file>
 
@@ -1690,7 +1731,7 @@
             <a:fld id="{B61BEF0D-F0BB-DE4B-95CE-6DB70DBA9567}" type="datetimeFigureOut">
               <a:rPr lang="en-US" dirty="0"/>
               <a:pPr/>
-              <a:t>1/19/16</a:t>
+              <a:t>1/22/16</a:t>
             </a:fld>
             <a:endParaRPr lang="en-US" dirty="0"/>
           </a:p>
@@ -1744,6 +1785,18 @@
   <p:clrMapOvr>
     <a:masterClrMapping/>
   </p:clrMapOvr>
+  <mc:AlternateContent xmlns:mc="http://schemas.openxmlformats.org/markup-compatibility/2006">
+    <mc:Choice xmlns:p14="http://schemas.microsoft.com/office/powerpoint/2010/main" Requires="p14">
+      <p:transition spd="med" p14:dur="700">
+        <p:fade/>
+      </p:transition>
+    </mc:Choice>
+    <mc:Fallback>
+      <p:transition spd="med">
+        <p:fade/>
+      </p:transition>
+    </mc:Fallback>
+  </mc:AlternateContent>
 </p:sldLayout>
 </file>
 
@@ -1935,7 +1988,7 @@
             <a:fld id="{B61BEF0D-F0BB-DE4B-95CE-6DB70DBA9567}" type="datetimeFigureOut">
               <a:rPr lang="en-US" dirty="0"/>
               <a:pPr/>
-              <a:t>1/19/16</a:t>
+              <a:t>1/22/16</a:t>
             </a:fld>
             <a:endParaRPr lang="en-US" dirty="0"/>
           </a:p>
@@ -1989,6 +2042,18 @@
   <p:clrMapOvr>
     <a:masterClrMapping/>
   </p:clrMapOvr>
+  <mc:AlternateContent xmlns:mc="http://schemas.openxmlformats.org/markup-compatibility/2006">
+    <mc:Choice xmlns:p14="http://schemas.microsoft.com/office/powerpoint/2010/main" Requires="p14">
+      <p:transition spd="med" p14:dur="700">
+        <p:fade/>
+      </p:transition>
+    </mc:Choice>
+    <mc:Fallback>
+      <p:transition spd="med">
+        <p:fade/>
+      </p:transition>
+    </mc:Fallback>
+  </mc:AlternateContent>
 </p:sldLayout>
 </file>
 
@@ -2464,7 +2529,7 @@
             <a:fld id="{B61BEF0D-F0BB-DE4B-95CE-6DB70DBA9567}" type="datetimeFigureOut">
               <a:rPr lang="en-US" dirty="0"/>
               <a:pPr/>
-              <a:t>1/19/16</a:t>
+              <a:t>1/22/16</a:t>
             </a:fld>
             <a:endParaRPr lang="en-US" dirty="0"/>
           </a:p>
@@ -2518,6 +2583,18 @@
   <p:clrMapOvr>
     <a:masterClrMapping/>
   </p:clrMapOvr>
+  <mc:AlternateContent xmlns:mc="http://schemas.openxmlformats.org/markup-compatibility/2006">
+    <mc:Choice xmlns:p14="http://schemas.microsoft.com/office/powerpoint/2010/main" Requires="p14">
+      <p:transition spd="med" p14:dur="700">
+        <p:fade/>
+      </p:transition>
+    </mc:Choice>
+    <mc:Fallback>
+      <p:transition spd="med">
+        <p:fade/>
+      </p:transition>
+    </mc:Fallback>
+  </mc:AlternateContent>
 </p:sldLayout>
 </file>
 
@@ -2758,7 +2835,7 @@
             <a:fld id="{B61BEF0D-F0BB-DE4B-95CE-6DB70DBA9567}" type="datetimeFigureOut">
               <a:rPr lang="en-US" dirty="0"/>
               <a:pPr/>
-              <a:t>1/19/16</a:t>
+              <a:t>1/22/16</a:t>
             </a:fld>
             <a:endParaRPr lang="en-US" dirty="0"/>
           </a:p>
@@ -2812,6 +2889,18 @@
   <p:clrMapOvr>
     <a:masterClrMapping/>
   </p:clrMapOvr>
+  <mc:AlternateContent xmlns:mc="http://schemas.openxmlformats.org/markup-compatibility/2006">
+    <mc:Choice xmlns:p14="http://schemas.microsoft.com/office/powerpoint/2010/main" Requires="p14">
+      <p:transition spd="med" p14:dur="700">
+        <p:fade/>
+      </p:transition>
+    </mc:Choice>
+    <mc:Fallback>
+      <p:transition spd="med">
+        <p:fade/>
+      </p:transition>
+    </mc:Fallback>
+  </mc:AlternateContent>
 </p:sldLayout>
 </file>
 
@@ -2929,7 +3018,7 @@
             <a:fld id="{B61BEF0D-F0BB-DE4B-95CE-6DB70DBA9567}" type="datetimeFigureOut">
               <a:rPr lang="en-US" dirty="0"/>
               <a:pPr/>
-              <a:t>1/19/16</a:t>
+              <a:t>1/22/16</a:t>
             </a:fld>
             <a:endParaRPr lang="en-US" dirty="0"/>
           </a:p>
@@ -2983,6 +3072,18 @@
   <p:clrMapOvr>
     <a:masterClrMapping/>
   </p:clrMapOvr>
+  <mc:AlternateContent xmlns:mc="http://schemas.openxmlformats.org/markup-compatibility/2006">
+    <mc:Choice xmlns:p14="http://schemas.microsoft.com/office/powerpoint/2010/main" Requires="p14">
+      <p:transition spd="med" p14:dur="700">
+        <p:fade/>
+      </p:transition>
+    </mc:Choice>
+    <mc:Fallback>
+      <p:transition spd="med">
+        <p:fade/>
+      </p:transition>
+    </mc:Fallback>
+  </mc:AlternateContent>
 </p:sldLayout>
 </file>
 
@@ -3106,7 +3207,7 @@
             <a:fld id="{B61BEF0D-F0BB-DE4B-95CE-6DB70DBA9567}" type="datetimeFigureOut">
               <a:rPr lang="en-US" dirty="0"/>
               <a:pPr/>
-              <a:t>1/19/16</a:t>
+              <a:t>1/22/16</a:t>
             </a:fld>
             <a:endParaRPr lang="en-US" dirty="0"/>
           </a:p>
@@ -3160,6 +3261,18 @@
   <p:clrMapOvr>
     <a:masterClrMapping/>
   </p:clrMapOvr>
+  <mc:AlternateContent xmlns:mc="http://schemas.openxmlformats.org/markup-compatibility/2006">
+    <mc:Choice xmlns:p14="http://schemas.microsoft.com/office/powerpoint/2010/main" Requires="p14">
+      <p:transition spd="med" p14:dur="700">
+        <p:fade/>
+      </p:transition>
+    </mc:Choice>
+    <mc:Fallback>
+      <p:transition spd="med">
+        <p:fade/>
+      </p:transition>
+    </mc:Fallback>
+  </mc:AlternateContent>
 </p:sldLayout>
 </file>
 
@@ -3273,7 +3386,7 @@
             <a:fld id="{B61BEF0D-F0BB-DE4B-95CE-6DB70DBA9567}" type="datetimeFigureOut">
               <a:rPr lang="en-US" dirty="0"/>
               <a:pPr/>
-              <a:t>1/19/16</a:t>
+              <a:t>1/22/16</a:t>
             </a:fld>
             <a:endParaRPr lang="en-US" dirty="0"/>
           </a:p>
@@ -3332,6 +3445,18 @@
   <p:clrMapOvr>
     <a:masterClrMapping/>
   </p:clrMapOvr>
+  <mc:AlternateContent xmlns:mc="http://schemas.openxmlformats.org/markup-compatibility/2006">
+    <mc:Choice xmlns:p14="http://schemas.microsoft.com/office/powerpoint/2010/main" Requires="p14">
+      <p:transition spd="med" p14:dur="700">
+        <p:fade/>
+      </p:transition>
+    </mc:Choice>
+    <mc:Fallback>
+      <p:transition spd="med">
+        <p:fade/>
+      </p:transition>
+    </mc:Fallback>
+  </mc:AlternateContent>
 </p:sldLayout>
 </file>
 
@@ -3521,7 +3646,7 @@
             <a:fld id="{B61BEF0D-F0BB-DE4B-95CE-6DB70DBA9567}" type="datetimeFigureOut">
               <a:rPr lang="en-US" dirty="0"/>
               <a:pPr/>
-              <a:t>1/19/16</a:t>
+              <a:t>1/22/16</a:t>
             </a:fld>
             <a:endParaRPr lang="en-US" dirty="0"/>
           </a:p>
@@ -3575,6 +3700,18 @@
   <p:clrMapOvr>
     <a:masterClrMapping/>
   </p:clrMapOvr>
+  <mc:AlternateContent xmlns:mc="http://schemas.openxmlformats.org/markup-compatibility/2006">
+    <mc:Choice xmlns:p14="http://schemas.microsoft.com/office/powerpoint/2010/main" Requires="p14">
+      <p:transition spd="med" p14:dur="700">
+        <p:fade/>
+      </p:transition>
+    </mc:Choice>
+    <mc:Fallback>
+      <p:transition spd="med">
+        <p:fade/>
+      </p:transition>
+    </mc:Fallback>
+  </mc:AlternateContent>
 </p:sldLayout>
 </file>
 
@@ -3815,7 +3952,7 @@
             <a:fld id="{B61BEF0D-F0BB-DE4B-95CE-6DB70DBA9567}" type="datetimeFigureOut">
               <a:rPr lang="en-US" dirty="0"/>
               <a:pPr/>
-              <a:t>1/19/16</a:t>
+              <a:t>1/22/16</a:t>
             </a:fld>
             <a:endParaRPr lang="en-US" dirty="0"/>
           </a:p>
@@ -3869,6 +4006,18 @@
   <p:clrMapOvr>
     <a:masterClrMapping/>
   </p:clrMapOvr>
+  <mc:AlternateContent xmlns:mc="http://schemas.openxmlformats.org/markup-compatibility/2006">
+    <mc:Choice xmlns:p14="http://schemas.microsoft.com/office/powerpoint/2010/main" Requires="p14">
+      <p:transition spd="med" p14:dur="700">
+        <p:fade/>
+      </p:transition>
+    </mc:Choice>
+    <mc:Fallback>
+      <p:transition spd="med">
+        <p:fade/>
+      </p:transition>
+    </mc:Fallback>
+  </mc:AlternateContent>
 </p:sldLayout>
 </file>
 
@@ -4254,7 +4403,7 @@
             <a:fld id="{B61BEF0D-F0BB-DE4B-95CE-6DB70DBA9567}" type="datetimeFigureOut">
               <a:rPr lang="en-US" dirty="0"/>
               <a:pPr/>
-              <a:t>1/19/16</a:t>
+              <a:t>1/22/16</a:t>
             </a:fld>
             <a:endParaRPr lang="en-US" dirty="0"/>
           </a:p>
@@ -4308,6 +4457,18 @@
   <p:clrMapOvr>
     <a:masterClrMapping/>
   </p:clrMapOvr>
+  <mc:AlternateContent xmlns:mc="http://schemas.openxmlformats.org/markup-compatibility/2006">
+    <mc:Choice xmlns:p14="http://schemas.microsoft.com/office/powerpoint/2010/main" Requires="p14">
+      <p:transition spd="med" p14:dur="700">
+        <p:fade/>
+      </p:transition>
+    </mc:Choice>
+    <mc:Fallback>
+      <p:transition spd="med">
+        <p:fade/>
+      </p:transition>
+    </mc:Fallback>
+  </mc:AlternateContent>
 </p:sldLayout>
 </file>
 
@@ -4369,7 +4530,7 @@
             <a:fld id="{B61BEF0D-F0BB-DE4B-95CE-6DB70DBA9567}" type="datetimeFigureOut">
               <a:rPr lang="en-US" dirty="0"/>
               <a:pPr/>
-              <a:t>1/19/16</a:t>
+              <a:t>1/22/16</a:t>
             </a:fld>
             <a:endParaRPr lang="en-US" dirty="0"/>
           </a:p>
@@ -4423,6 +4584,18 @@
   <p:clrMapOvr>
     <a:masterClrMapping/>
   </p:clrMapOvr>
+  <mc:AlternateContent xmlns:mc="http://schemas.openxmlformats.org/markup-compatibility/2006">
+    <mc:Choice xmlns:p14="http://schemas.microsoft.com/office/powerpoint/2010/main" Requires="p14">
+      <p:transition spd="med" p14:dur="700">
+        <p:fade/>
+      </p:transition>
+    </mc:Choice>
+    <mc:Fallback>
+      <p:transition spd="med">
+        <p:fade/>
+      </p:transition>
+    </mc:Fallback>
+  </mc:AlternateContent>
 </p:sldLayout>
 </file>
 
@@ -4461,7 +4634,7 @@
             <a:fld id="{B61BEF0D-F0BB-DE4B-95CE-6DB70DBA9567}" type="datetimeFigureOut">
               <a:rPr lang="en-US" dirty="0"/>
               <a:pPr/>
-              <a:t>1/19/16</a:t>
+              <a:t>1/22/16</a:t>
             </a:fld>
             <a:endParaRPr lang="en-US" dirty="0"/>
           </a:p>
@@ -4515,6 +4688,18 @@
   <p:clrMapOvr>
     <a:masterClrMapping/>
   </p:clrMapOvr>
+  <mc:AlternateContent xmlns:mc="http://schemas.openxmlformats.org/markup-compatibility/2006">
+    <mc:Choice xmlns:p14="http://schemas.microsoft.com/office/powerpoint/2010/main" Requires="p14">
+      <p:transition spd="med" p14:dur="700">
+        <p:fade/>
+      </p:transition>
+    </mc:Choice>
+    <mc:Fallback>
+      <p:transition spd="med">
+        <p:fade/>
+      </p:transition>
+    </mc:Fallback>
+  </mc:AlternateContent>
 </p:sldLayout>
 </file>
 
@@ -4741,7 +4926,7 @@
             <a:fld id="{B61BEF0D-F0BB-DE4B-95CE-6DB70DBA9567}" type="datetimeFigureOut">
               <a:rPr lang="en-US" dirty="0"/>
               <a:pPr/>
-              <a:t>1/19/16</a:t>
+              <a:t>1/22/16</a:t>
             </a:fld>
             <a:endParaRPr lang="en-US" dirty="0"/>
           </a:p>
@@ -4795,6 +4980,18 @@
   <p:clrMapOvr>
     <a:masterClrMapping/>
   </p:clrMapOvr>
+  <mc:AlternateContent xmlns:mc="http://schemas.openxmlformats.org/markup-compatibility/2006">
+    <mc:Choice xmlns:p14="http://schemas.microsoft.com/office/powerpoint/2010/main" Requires="p14">
+      <p:transition spd="med" p14:dur="700">
+        <p:fade/>
+      </p:transition>
+    </mc:Choice>
+    <mc:Fallback>
+      <p:transition spd="med">
+        <p:fade/>
+      </p:transition>
+    </mc:Fallback>
+  </mc:AlternateContent>
 </p:sldLayout>
 </file>
 
@@ -5029,7 +5226,7 @@
             <a:fld id="{B61BEF0D-F0BB-DE4B-95CE-6DB70DBA9567}" type="datetimeFigureOut">
               <a:rPr lang="en-US" dirty="0"/>
               <a:pPr/>
-              <a:t>1/19/16</a:t>
+              <a:t>1/22/16</a:t>
             </a:fld>
             <a:endParaRPr lang="en-US" dirty="0"/>
           </a:p>
@@ -5083,6 +5280,18 @@
   <p:clrMapOvr>
     <a:masterClrMapping/>
   </p:clrMapOvr>
+  <mc:AlternateContent xmlns:mc="http://schemas.openxmlformats.org/markup-compatibility/2006">
+    <mc:Choice xmlns:p14="http://schemas.microsoft.com/office/powerpoint/2010/main" Requires="p14">
+      <p:transition spd="med" p14:dur="700">
+        <p:fade/>
+      </p:transition>
+    </mc:Choice>
+    <mc:Fallback>
+      <p:transition spd="med">
+        <p:fade/>
+      </p:transition>
+    </mc:Fallback>
+  </mc:AlternateContent>
 </p:sldLayout>
 </file>
 
@@ -5556,7 +5765,7 @@
             <a:fld id="{B61BEF0D-F0BB-DE4B-95CE-6DB70DBA9567}" type="datetimeFigureOut">
               <a:rPr lang="en-US" dirty="0"/>
               <a:pPr/>
-              <a:t>1/19/16</a:t>
+              <a:t>1/22/16</a:t>
             </a:fld>
             <a:endParaRPr lang="en-US" dirty="0"/>
           </a:p>
@@ -5663,6 +5872,18 @@
     <p:sldLayoutId id="2147483658" r:id="rId16"/>
     <p:sldLayoutId id="2147483659" r:id="rId17"/>
   </p:sldLayoutIdLst>
+  <mc:AlternateContent xmlns:mc="http://schemas.openxmlformats.org/markup-compatibility/2006">
+    <mc:Choice xmlns:p14="http://schemas.microsoft.com/office/powerpoint/2010/main" Requires="p14">
+      <p:transition spd="med" p14:dur="700">
+        <p:fade/>
+      </p:transition>
+    </mc:Choice>
+    <mc:Fallback>
+      <p:transition spd="med">
+        <p:fade/>
+      </p:transition>
+    </mc:Fallback>
+  </mc:AlternateContent>
   <p:txStyles>
     <p:titleStyle>
       <a:lvl1pPr algn="ctr" defTabSz="457200" rtl="0" eaLnBrk="1" latinLnBrk="0" hangingPunct="1">
@@ -6159,6 +6380,25 @@
   <p:clrMapOvr>
     <a:masterClrMapping/>
   </p:clrMapOvr>
+  <mc:AlternateContent xmlns:mc="http://schemas.openxmlformats.org/markup-compatibility/2006">
+    <mc:Choice xmlns:p14="http://schemas.microsoft.com/office/powerpoint/2010/main" Requires="p14">
+      <p:transition spd="med" p14:dur="700">
+        <p:fade/>
+      </p:transition>
+    </mc:Choice>
+    <mc:Fallback>
+      <p:transition spd="med">
+        <p:fade/>
+      </p:transition>
+    </mc:Fallback>
+  </mc:AlternateContent>
+  <p:timing>
+    <p:tnLst>
+      <p:par>
+        <p:cTn id="1" dur="indefinite" restart="never" nodeType="tmRoot"/>
+      </p:par>
+    </p:tnLst>
+  </p:timing>
 </p:sld>
 </file>
 
@@ -6295,6 +6535,25 @@
   <p:clrMapOvr>
     <a:masterClrMapping/>
   </p:clrMapOvr>
+  <mc:AlternateContent xmlns:mc="http://schemas.openxmlformats.org/markup-compatibility/2006">
+    <mc:Choice xmlns:p14="http://schemas.microsoft.com/office/powerpoint/2010/main" Requires="p14">
+      <p:transition spd="med" p14:dur="700">
+        <p:fade/>
+      </p:transition>
+    </mc:Choice>
+    <mc:Fallback>
+      <p:transition spd="med">
+        <p:fade/>
+      </p:transition>
+    </mc:Fallback>
+  </mc:AlternateContent>
+  <p:timing>
+    <p:tnLst>
+      <p:par>
+        <p:cTn id="1" dur="indefinite" restart="never" nodeType="tmRoot"/>
+      </p:par>
+    </p:tnLst>
+  </p:timing>
 </p:sld>
 </file>
 
@@ -6429,6 +6688,25 @@
   <p:clrMapOvr>
     <a:masterClrMapping/>
   </p:clrMapOvr>
+  <mc:AlternateContent xmlns:mc="http://schemas.openxmlformats.org/markup-compatibility/2006">
+    <mc:Choice xmlns:p14="http://schemas.microsoft.com/office/powerpoint/2010/main" Requires="p14">
+      <p:transition spd="med" p14:dur="700">
+        <p:fade/>
+      </p:transition>
+    </mc:Choice>
+    <mc:Fallback>
+      <p:transition spd="med">
+        <p:fade/>
+      </p:transition>
+    </mc:Fallback>
+  </mc:AlternateContent>
+  <p:timing>
+    <p:tnLst>
+      <p:par>
+        <p:cTn id="1" dur="indefinite" restart="never" nodeType="tmRoot"/>
+      </p:par>
+    </p:tnLst>
+  </p:timing>
 </p:sld>
 </file>
 
@@ -6529,6 +6807,25 @@
   <p:clrMapOvr>
     <a:masterClrMapping/>
   </p:clrMapOvr>
+  <mc:AlternateContent xmlns:mc="http://schemas.openxmlformats.org/markup-compatibility/2006">
+    <mc:Choice xmlns:p14="http://schemas.microsoft.com/office/powerpoint/2010/main" Requires="p14">
+      <p:transition spd="med" p14:dur="700">
+        <p:fade/>
+      </p:transition>
+    </mc:Choice>
+    <mc:Fallback>
+      <p:transition spd="med">
+        <p:fade/>
+      </p:transition>
+    </mc:Fallback>
+  </mc:AlternateContent>
+  <p:timing>
+    <p:tnLst>
+      <p:par>
+        <p:cTn id="1" dur="indefinite" restart="never" nodeType="tmRoot"/>
+      </p:par>
+    </p:tnLst>
+  </p:timing>
 </p:sld>
 </file>
 
@@ -6616,6 +6913,25 @@
   <p:clrMapOvr>
     <a:masterClrMapping/>
   </p:clrMapOvr>
+  <mc:AlternateContent xmlns:mc="http://schemas.openxmlformats.org/markup-compatibility/2006">
+    <mc:Choice xmlns:p14="http://schemas.microsoft.com/office/powerpoint/2010/main" Requires="p14">
+      <p:transition spd="med" p14:dur="700">
+        <p:fade/>
+      </p:transition>
+    </mc:Choice>
+    <mc:Fallback>
+      <p:transition spd="med">
+        <p:fade/>
+      </p:transition>
+    </mc:Fallback>
+  </mc:AlternateContent>
+  <p:timing>
+    <p:tnLst>
+      <p:par>
+        <p:cTn id="1" dur="indefinite" restart="never" nodeType="tmRoot"/>
+      </p:par>
+    </p:tnLst>
+  </p:timing>
 </p:sld>
 </file>
 
@@ -6728,6 +7044,25 @@
   <p:clrMapOvr>
     <a:masterClrMapping/>
   </p:clrMapOvr>
+  <mc:AlternateContent xmlns:mc="http://schemas.openxmlformats.org/markup-compatibility/2006">
+    <mc:Choice xmlns:p14="http://schemas.microsoft.com/office/powerpoint/2010/main" Requires="p14">
+      <p:transition spd="med" p14:dur="700">
+        <p:fade/>
+      </p:transition>
+    </mc:Choice>
+    <mc:Fallback>
+      <p:transition spd="med">
+        <p:fade/>
+      </p:transition>
+    </mc:Fallback>
+  </mc:AlternateContent>
+  <p:timing>
+    <p:tnLst>
+      <p:par>
+        <p:cTn id="1" dur="indefinite" restart="never" nodeType="tmRoot"/>
+      </p:par>
+    </p:tnLst>
+  </p:timing>
 </p:sld>
 </file>
 

</xml_diff>